<commit_message>
added image sources to presentation
</commit_message>
<xml_diff>
--- a/Presentation.pptx
+++ b/Presentation.pptx
@@ -3749,6 +3749,56 @@
           </a:p>
         </p:txBody>
       </p:sp>
+      <p:sp>
+        <p:nvSpPr>
+          <p:cNvPr id="6" name="Textfeld 5"/>
+          <p:cNvSpPr txBox="1"/>
+          <p:nvPr/>
+        </p:nvSpPr>
+        <p:spPr bwMode="auto">
+          <a:xfrm>
+            <a:off x="395288" y="6324117"/>
+            <a:ext cx="8353425" cy="123111"/>
+          </a:xfrm>
+          <a:prstGeom prst="rect">
+            <a:avLst/>
+          </a:prstGeom>
+          <a:noFill/>
+          <a:ln w="19050">
+            <a:noFill/>
+            <a:miter lim="800000"/>
+            <a:headEnd/>
+            <a:tailEnd/>
+          </a:ln>
+          <a:effectLst/>
+        </p:spPr>
+        <p:txBody>
+          <a:bodyPr vert="horz" wrap="square" lIns="0" tIns="0" rIns="0" bIns="0" numCol="1" rtlCol="0" anchor="b" anchorCtr="0" compatLnSpc="1">
+            <a:prstTxWarp prst="textNoShape">
+              <a:avLst/>
+            </a:prstTxWarp>
+            <a:spAutoFit/>
+          </a:bodyPr>
+          <a:lstStyle/>
+          <a:p>
+            <a:r>
+              <a:rPr lang="de-DE" sz="800" b="0" dirty="0">
+                <a:latin typeface="Arial" panose="020B0604020202020204" pitchFamily="34" charset="0"/>
+              </a:rPr>
+              <a:t>Source: </a:t>
+            </a:r>
+            <a:r>
+              <a:rPr lang="en-US" sz="800" dirty="0">
+                <a:latin typeface="Arial" panose="020B0604020202020204" pitchFamily="34" charset="0"/>
+              </a:rPr>
+              <a:t>http://vignette1.wikia.nocookie.net/southpark2/images/c/c1/South_Park_Season_14.png/revision/latest?cb=20140423142814&amp;path-prefix=de</a:t>
+            </a:r>
+            <a:endParaRPr lang="en-US" sz="800" dirty="0">
+              <a:latin typeface="Arial" panose="020B0604020202020204" pitchFamily="34" charset="0"/>
+            </a:endParaRPr>
+          </a:p>
+        </p:txBody>
+      </p:sp>
     </p:spTree>
   </p:cSld>
   <p:clrMapOvr>
@@ -13075,6 +13125,110 @@
           </a:extLst>
         </p:spPr>
       </p:pic>
+      <p:sp>
+        <p:nvSpPr>
+          <p:cNvPr id="5" name="Textfeld 4"/>
+          <p:cNvSpPr txBox="1"/>
+          <p:nvPr/>
+        </p:nvSpPr>
+        <p:spPr bwMode="auto">
+          <a:xfrm>
+            <a:off x="376329" y="6186844"/>
+            <a:ext cx="8353425" cy="123111"/>
+          </a:xfrm>
+          <a:prstGeom prst="rect">
+            <a:avLst/>
+          </a:prstGeom>
+          <a:noFill/>
+          <a:ln w="19050">
+            <a:noFill/>
+            <a:miter lim="800000"/>
+            <a:headEnd/>
+            <a:tailEnd/>
+          </a:ln>
+          <a:effectLst/>
+        </p:spPr>
+        <p:txBody>
+          <a:bodyPr vert="horz" wrap="square" lIns="0" tIns="0" rIns="0" bIns="0" numCol="1" rtlCol="0" anchor="b" anchorCtr="0" compatLnSpc="1">
+            <a:prstTxWarp prst="textNoShape">
+              <a:avLst/>
+            </a:prstTxWarp>
+            <a:spAutoFit/>
+          </a:bodyPr>
+          <a:lstStyle/>
+          <a:p>
+            <a:r>
+              <a:rPr lang="de-DE" sz="800" dirty="0" err="1">
+                <a:latin typeface="Arial" panose="020B0604020202020204" pitchFamily="34" charset="0"/>
+              </a:rPr>
+              <a:t>Source:</a:t>
+            </a:r>
+            <a:r>
+              <a:rPr lang="de-DE" sz="800" dirty="0" err="1">
+                <a:latin typeface="Arial" panose="020B0604020202020204" pitchFamily="34" charset="0"/>
+              </a:rPr>
+              <a:t>http</a:t>
+            </a:r>
+            <a:r>
+              <a:rPr lang="de-DE" sz="800" dirty="0">
+                <a:latin typeface="Arial" panose="020B0604020202020204" pitchFamily="34" charset="0"/>
+              </a:rPr>
+              <a:t>://1.images.southparkstudios.com/</a:t>
+            </a:r>
+            <a:r>
+              <a:rPr lang="de-DE" sz="800" dirty="0" err="1">
+                <a:latin typeface="Arial" panose="020B0604020202020204" pitchFamily="34" charset="0"/>
+              </a:rPr>
+              <a:t>shared</a:t>
+            </a:r>
+            <a:r>
+              <a:rPr lang="de-DE" sz="800" dirty="0">
+                <a:latin typeface="Arial" panose="020B0604020202020204" pitchFamily="34" charset="0"/>
+              </a:rPr>
+              <a:t>/</a:t>
+            </a:r>
+            <a:r>
+              <a:rPr lang="de-DE" sz="800" dirty="0" err="1">
+                <a:latin typeface="Arial" panose="020B0604020202020204" pitchFamily="34" charset="0"/>
+              </a:rPr>
+              <a:t>homepage</a:t>
+            </a:r>
+            <a:r>
+              <a:rPr lang="de-DE" sz="800" dirty="0">
+                <a:latin typeface="Arial" panose="020B0604020202020204" pitchFamily="34" charset="0"/>
+              </a:rPr>
+              <a:t>/</a:t>
+            </a:r>
+            <a:r>
+              <a:rPr lang="de-DE" sz="800" dirty="0" err="1">
+                <a:latin typeface="Arial" panose="020B0604020202020204" pitchFamily="34" charset="0"/>
+              </a:rPr>
+              <a:t>promos</a:t>
+            </a:r>
+            <a:r>
+              <a:rPr lang="de-DE" sz="800" dirty="0">
+                <a:latin typeface="Arial" panose="020B0604020202020204" pitchFamily="34" charset="0"/>
+              </a:rPr>
+              <a:t>/</a:t>
+            </a:r>
+            <a:r>
+              <a:rPr lang="de-DE" sz="800" dirty="0" err="1">
+                <a:latin typeface="Arial" panose="020B0604020202020204" pitchFamily="34" charset="0"/>
+              </a:rPr>
+              <a:t>sp_fbw-gamesPage.jpg?quality</a:t>
+            </a:r>
+            <a:r>
+              <a:rPr lang="de-DE" sz="800" dirty="0">
+                <a:latin typeface="Arial" panose="020B0604020202020204" pitchFamily="34" charset="0"/>
+              </a:rPr>
+              <a:t>=0.8</a:t>
+            </a:r>
+            <a:endParaRPr lang="en-US" sz="800" dirty="0">
+              <a:latin typeface="Arial" panose="020B0604020202020204" pitchFamily="34" charset="0"/>
+            </a:endParaRPr>
+          </a:p>
+        </p:txBody>
+      </p:sp>
     </p:spTree>
     <p:extLst>
       <p:ext uri="{BB962C8B-B14F-4D97-AF65-F5344CB8AC3E}">

</xml_diff>